<commit_message>
changed font to Verdana
</commit_message>
<xml_diff>
--- a/results/legend.pptx
+++ b/results/legend.pptx
@@ -1,6 +1,6 @@
 
 <file path=ppt/presentation.xml><?xml version="1.0" encoding="utf-8"?>
-<p:presentation xmlns:a="http://schemas.openxmlformats.org/drawingml/2006/main" xmlns:r="http://schemas.openxmlformats.org/officeDocument/2006/relationships" xmlns:mc="http://schemas.openxmlformats.org/markup-compatibility/2006" xmlns:mv="urn:schemas-microsoft-com:mac:vml" xmlns:p="http://schemas.openxmlformats.org/presentationml/2006/main" mc:Ignorable="mv" mc:PreserveAttributes="mv:*" saveSubsetFonts="1" autoCompressPictures="0">
+<p:presentation xmlns:a="http://schemas.openxmlformats.org/drawingml/2006/main" xmlns:r="http://schemas.openxmlformats.org/officeDocument/2006/relationships" xmlns:p="http://schemas.openxmlformats.org/presentationml/2006/main" saveSubsetFonts="1" autoCompressPictures="0">
   <p:sldMasterIdLst>
     <p:sldMasterId id="2147483648" r:id="rId1"/>
   </p:sldMasterIdLst>
@@ -108,7 +108,7 @@
 </file>
 
 <file path=ppt/slideLayouts/slideLayout1.xml><?xml version="1.0" encoding="utf-8"?>
-<p:sldLayout xmlns:a="http://schemas.openxmlformats.org/drawingml/2006/main" xmlns:r="http://schemas.openxmlformats.org/officeDocument/2006/relationships" xmlns:mc="http://schemas.openxmlformats.org/markup-compatibility/2006" xmlns:mv="urn:schemas-microsoft-com:mac:vml" xmlns:p="http://schemas.openxmlformats.org/presentationml/2006/main" mc:Ignorable="mv" mc:PreserveAttributes="mv:*" type="title" preserve="1">
+<p:sldLayout xmlns:a="http://schemas.openxmlformats.org/drawingml/2006/main" xmlns:r="http://schemas.openxmlformats.org/officeDocument/2006/relationships" xmlns:p="http://schemas.openxmlformats.org/presentationml/2006/main" type="title" preserve="1">
   <p:cSld name="Title Slide">
     <p:spTree>
       <p:nvGrpSpPr>
@@ -288,7 +288,7 @@
           <a:p>
             <a:fld id="{B1407716-76A5-4A4B-BEC0-21135680BD29}" type="datetimeFigureOut">
               <a:rPr lang="en-US" smtClean="0"/>
-              <a:t>4/5/17</a:t>
+              <a:t>06/04/2017</a:t>
             </a:fld>
             <a:endParaRPr lang="en-US"/>
           </a:p>
@@ -345,7 +345,7 @@
 </file>
 
 <file path=ppt/slideLayouts/slideLayout10.xml><?xml version="1.0" encoding="utf-8"?>
-<p:sldLayout xmlns:a="http://schemas.openxmlformats.org/drawingml/2006/main" xmlns:r="http://schemas.openxmlformats.org/officeDocument/2006/relationships" xmlns:mc="http://schemas.openxmlformats.org/markup-compatibility/2006" xmlns:mv="urn:schemas-microsoft-com:mac:vml" xmlns:p="http://schemas.openxmlformats.org/presentationml/2006/main" mc:Ignorable="mv" mc:PreserveAttributes="mv:*" type="vertTx" preserve="1">
+<p:sldLayout xmlns:a="http://schemas.openxmlformats.org/drawingml/2006/main" xmlns:r="http://schemas.openxmlformats.org/officeDocument/2006/relationships" xmlns:p="http://schemas.openxmlformats.org/presentationml/2006/main" type="vertTx" preserve="1">
   <p:cSld name="Title and Vertical Text">
     <p:spTree>
       <p:nvGrpSpPr>
@@ -453,7 +453,7 @@
           <a:p>
             <a:fld id="{B1407716-76A5-4A4B-BEC0-21135680BD29}" type="datetimeFigureOut">
               <a:rPr lang="en-US" smtClean="0"/>
-              <a:t>4/5/17</a:t>
+              <a:t>06/04/2017</a:t>
             </a:fld>
             <a:endParaRPr lang="en-US"/>
           </a:p>
@@ -510,7 +510,7 @@
 </file>
 
 <file path=ppt/slideLayouts/slideLayout11.xml><?xml version="1.0" encoding="utf-8"?>
-<p:sldLayout xmlns:a="http://schemas.openxmlformats.org/drawingml/2006/main" xmlns:r="http://schemas.openxmlformats.org/officeDocument/2006/relationships" xmlns:mc="http://schemas.openxmlformats.org/markup-compatibility/2006" xmlns:mv="urn:schemas-microsoft-com:mac:vml" xmlns:p="http://schemas.openxmlformats.org/presentationml/2006/main" mc:Ignorable="mv" mc:PreserveAttributes="mv:*" type="vertTitleAndTx" preserve="1">
+<p:sldLayout xmlns:a="http://schemas.openxmlformats.org/drawingml/2006/main" xmlns:r="http://schemas.openxmlformats.org/officeDocument/2006/relationships" xmlns:p="http://schemas.openxmlformats.org/presentationml/2006/main" type="vertTitleAndTx" preserve="1">
   <p:cSld name="Vertical Title and Text">
     <p:spTree>
       <p:nvGrpSpPr>
@@ -628,7 +628,7 @@
           <a:p>
             <a:fld id="{B1407716-76A5-4A4B-BEC0-21135680BD29}" type="datetimeFigureOut">
               <a:rPr lang="en-US" smtClean="0"/>
-              <a:t>4/5/17</a:t>
+              <a:t>06/04/2017</a:t>
             </a:fld>
             <a:endParaRPr lang="en-US"/>
           </a:p>
@@ -685,7 +685,7 @@
 </file>
 
 <file path=ppt/slideLayouts/slideLayout2.xml><?xml version="1.0" encoding="utf-8"?>
-<p:sldLayout xmlns:a="http://schemas.openxmlformats.org/drawingml/2006/main" xmlns:r="http://schemas.openxmlformats.org/officeDocument/2006/relationships" xmlns:mc="http://schemas.openxmlformats.org/markup-compatibility/2006" xmlns:mv="urn:schemas-microsoft-com:mac:vml" xmlns:p="http://schemas.openxmlformats.org/presentationml/2006/main" mc:Ignorable="mv" mc:PreserveAttributes="mv:*" type="obj" preserve="1">
+<p:sldLayout xmlns:a="http://schemas.openxmlformats.org/drawingml/2006/main" xmlns:r="http://schemas.openxmlformats.org/officeDocument/2006/relationships" xmlns:p="http://schemas.openxmlformats.org/presentationml/2006/main" type="obj" preserve="1">
   <p:cSld name="Title and Content">
     <p:spTree>
       <p:nvGrpSpPr>
@@ -793,7 +793,7 @@
           <a:p>
             <a:fld id="{B1407716-76A5-4A4B-BEC0-21135680BD29}" type="datetimeFigureOut">
               <a:rPr lang="en-US" smtClean="0"/>
-              <a:t>4/5/17</a:t>
+              <a:t>06/04/2017</a:t>
             </a:fld>
             <a:endParaRPr lang="en-US"/>
           </a:p>
@@ -850,7 +850,7 @@
 </file>
 
 <file path=ppt/slideLayouts/slideLayout3.xml><?xml version="1.0" encoding="utf-8"?>
-<p:sldLayout xmlns:a="http://schemas.openxmlformats.org/drawingml/2006/main" xmlns:r="http://schemas.openxmlformats.org/officeDocument/2006/relationships" xmlns:mc="http://schemas.openxmlformats.org/markup-compatibility/2006" xmlns:mv="urn:schemas-microsoft-com:mac:vml" xmlns:p="http://schemas.openxmlformats.org/presentationml/2006/main" mc:Ignorable="mv" mc:PreserveAttributes="mv:*" type="secHead" preserve="1">
+<p:sldLayout xmlns:a="http://schemas.openxmlformats.org/drawingml/2006/main" xmlns:r="http://schemas.openxmlformats.org/officeDocument/2006/relationships" xmlns:p="http://schemas.openxmlformats.org/presentationml/2006/main" type="secHead" preserve="1">
   <p:cSld name="Section Header">
     <p:spTree>
       <p:nvGrpSpPr>
@@ -1034,7 +1034,7 @@
           <a:p>
             <a:fld id="{B1407716-76A5-4A4B-BEC0-21135680BD29}" type="datetimeFigureOut">
               <a:rPr lang="en-US" smtClean="0"/>
-              <a:t>4/5/17</a:t>
+              <a:t>06/04/2017</a:t>
             </a:fld>
             <a:endParaRPr lang="en-US"/>
           </a:p>
@@ -1091,7 +1091,7 @@
 </file>
 
 <file path=ppt/slideLayouts/slideLayout4.xml><?xml version="1.0" encoding="utf-8"?>
-<p:sldLayout xmlns:a="http://schemas.openxmlformats.org/drawingml/2006/main" xmlns:r="http://schemas.openxmlformats.org/officeDocument/2006/relationships" xmlns:mc="http://schemas.openxmlformats.org/markup-compatibility/2006" xmlns:mv="urn:schemas-microsoft-com:mac:vml" xmlns:p="http://schemas.openxmlformats.org/presentationml/2006/main" mc:Ignorable="mv" mc:PreserveAttributes="mv:*" type="twoObj" preserve="1">
+<p:sldLayout xmlns:a="http://schemas.openxmlformats.org/drawingml/2006/main" xmlns:r="http://schemas.openxmlformats.org/officeDocument/2006/relationships" xmlns:p="http://schemas.openxmlformats.org/presentationml/2006/main" type="twoObj" preserve="1">
   <p:cSld name="Two Content">
     <p:spTree>
       <p:nvGrpSpPr>
@@ -1317,7 +1317,7 @@
           <a:p>
             <a:fld id="{B1407716-76A5-4A4B-BEC0-21135680BD29}" type="datetimeFigureOut">
               <a:rPr lang="en-US" smtClean="0"/>
-              <a:t>4/5/17</a:t>
+              <a:t>06/04/2017</a:t>
             </a:fld>
             <a:endParaRPr lang="en-US"/>
           </a:p>
@@ -1374,7 +1374,7 @@
 </file>
 
 <file path=ppt/slideLayouts/slideLayout5.xml><?xml version="1.0" encoding="utf-8"?>
-<p:sldLayout xmlns:a="http://schemas.openxmlformats.org/drawingml/2006/main" xmlns:r="http://schemas.openxmlformats.org/officeDocument/2006/relationships" xmlns:mc="http://schemas.openxmlformats.org/markup-compatibility/2006" xmlns:mv="urn:schemas-microsoft-com:mac:vml" xmlns:p="http://schemas.openxmlformats.org/presentationml/2006/main" mc:Ignorable="mv" mc:PreserveAttributes="mv:*" type="twoTxTwoObj" preserve="1">
+<p:sldLayout xmlns:a="http://schemas.openxmlformats.org/drawingml/2006/main" xmlns:r="http://schemas.openxmlformats.org/officeDocument/2006/relationships" xmlns:p="http://schemas.openxmlformats.org/presentationml/2006/main" type="twoTxTwoObj" preserve="1">
   <p:cSld name="Comparison">
     <p:spTree>
       <p:nvGrpSpPr>
@@ -1734,7 +1734,7 @@
           <a:p>
             <a:fld id="{B1407716-76A5-4A4B-BEC0-21135680BD29}" type="datetimeFigureOut">
               <a:rPr lang="en-US" smtClean="0"/>
-              <a:t>4/5/17</a:t>
+              <a:t>06/04/2017</a:t>
             </a:fld>
             <a:endParaRPr lang="en-US"/>
           </a:p>
@@ -1791,7 +1791,7 @@
 </file>
 
 <file path=ppt/slideLayouts/slideLayout6.xml><?xml version="1.0" encoding="utf-8"?>
-<p:sldLayout xmlns:a="http://schemas.openxmlformats.org/drawingml/2006/main" xmlns:r="http://schemas.openxmlformats.org/officeDocument/2006/relationships" xmlns:mc="http://schemas.openxmlformats.org/markup-compatibility/2006" xmlns:mv="urn:schemas-microsoft-com:mac:vml" xmlns:p="http://schemas.openxmlformats.org/presentationml/2006/main" mc:Ignorable="mv" mc:PreserveAttributes="mv:*" type="titleOnly" preserve="1">
+<p:sldLayout xmlns:a="http://schemas.openxmlformats.org/drawingml/2006/main" xmlns:r="http://schemas.openxmlformats.org/officeDocument/2006/relationships" xmlns:p="http://schemas.openxmlformats.org/presentationml/2006/main" type="titleOnly" preserve="1">
   <p:cSld name="Title Only">
     <p:spTree>
       <p:nvGrpSpPr>
@@ -1847,7 +1847,7 @@
           <a:p>
             <a:fld id="{B1407716-76A5-4A4B-BEC0-21135680BD29}" type="datetimeFigureOut">
               <a:rPr lang="en-US" smtClean="0"/>
-              <a:t>4/5/17</a:t>
+              <a:t>06/04/2017</a:t>
             </a:fld>
             <a:endParaRPr lang="en-US"/>
           </a:p>
@@ -1904,7 +1904,7 @@
 </file>
 
 <file path=ppt/slideLayouts/slideLayout7.xml><?xml version="1.0" encoding="utf-8"?>
-<p:sldLayout xmlns:a="http://schemas.openxmlformats.org/drawingml/2006/main" xmlns:r="http://schemas.openxmlformats.org/officeDocument/2006/relationships" xmlns:mc="http://schemas.openxmlformats.org/markup-compatibility/2006" xmlns:mv="urn:schemas-microsoft-com:mac:vml" xmlns:p="http://schemas.openxmlformats.org/presentationml/2006/main" mc:Ignorable="mv" mc:PreserveAttributes="mv:*" type="blank" preserve="1">
+<p:sldLayout xmlns:a="http://schemas.openxmlformats.org/drawingml/2006/main" xmlns:r="http://schemas.openxmlformats.org/officeDocument/2006/relationships" xmlns:p="http://schemas.openxmlformats.org/presentationml/2006/main" type="blank" preserve="1">
   <p:cSld name="Blank">
     <p:spTree>
       <p:nvGrpSpPr>
@@ -1937,7 +1937,7 @@
           <a:p>
             <a:fld id="{B1407716-76A5-4A4B-BEC0-21135680BD29}" type="datetimeFigureOut">
               <a:rPr lang="en-US" smtClean="0"/>
-              <a:t>4/5/17</a:t>
+              <a:t>06/04/2017</a:t>
             </a:fld>
             <a:endParaRPr lang="en-US"/>
           </a:p>
@@ -1994,7 +1994,7 @@
 </file>
 
 <file path=ppt/slideLayouts/slideLayout8.xml><?xml version="1.0" encoding="utf-8"?>
-<p:sldLayout xmlns:a="http://schemas.openxmlformats.org/drawingml/2006/main" xmlns:r="http://schemas.openxmlformats.org/officeDocument/2006/relationships" xmlns:mc="http://schemas.openxmlformats.org/markup-compatibility/2006" xmlns:mv="urn:schemas-microsoft-com:mac:vml" xmlns:p="http://schemas.openxmlformats.org/presentationml/2006/main" mc:Ignorable="mv" mc:PreserveAttributes="mv:*" type="objTx" preserve="1">
+<p:sldLayout xmlns:a="http://schemas.openxmlformats.org/drawingml/2006/main" xmlns:r="http://schemas.openxmlformats.org/officeDocument/2006/relationships" xmlns:p="http://schemas.openxmlformats.org/presentationml/2006/main" type="objTx" preserve="1">
   <p:cSld name="Content with Caption">
     <p:spTree>
       <p:nvGrpSpPr>
@@ -2209,7 +2209,7 @@
           <a:p>
             <a:fld id="{B1407716-76A5-4A4B-BEC0-21135680BD29}" type="datetimeFigureOut">
               <a:rPr lang="en-US" smtClean="0"/>
-              <a:t>4/5/17</a:t>
+              <a:t>06/04/2017</a:t>
             </a:fld>
             <a:endParaRPr lang="en-US"/>
           </a:p>
@@ -2266,7 +2266,7 @@
 </file>
 
 <file path=ppt/slideLayouts/slideLayout9.xml><?xml version="1.0" encoding="utf-8"?>
-<p:sldLayout xmlns:a="http://schemas.openxmlformats.org/drawingml/2006/main" xmlns:r="http://schemas.openxmlformats.org/officeDocument/2006/relationships" xmlns:mc="http://schemas.openxmlformats.org/markup-compatibility/2006" xmlns:mv="urn:schemas-microsoft-com:mac:vml" xmlns:p="http://schemas.openxmlformats.org/presentationml/2006/main" mc:Ignorable="mv" mc:PreserveAttributes="mv:*" type="picTx" preserve="1">
+<p:sldLayout xmlns:a="http://schemas.openxmlformats.org/drawingml/2006/main" xmlns:r="http://schemas.openxmlformats.org/officeDocument/2006/relationships" xmlns:p="http://schemas.openxmlformats.org/presentationml/2006/main" type="picTx" preserve="1">
   <p:cSld name="Picture with Caption">
     <p:spTree>
       <p:nvGrpSpPr>
@@ -2457,7 +2457,7 @@
           <a:p>
             <a:fld id="{B1407716-76A5-4A4B-BEC0-21135680BD29}" type="datetimeFigureOut">
               <a:rPr lang="en-US" smtClean="0"/>
-              <a:t>4/5/17</a:t>
+              <a:t>06/04/2017</a:t>
             </a:fld>
             <a:endParaRPr lang="en-US"/>
           </a:p>
@@ -2514,7 +2514,7 @@
 </file>
 
 <file path=ppt/slideMasters/slideMaster1.xml><?xml version="1.0" encoding="utf-8"?>
-<p:sldMaster xmlns:a="http://schemas.openxmlformats.org/drawingml/2006/main" xmlns:r="http://schemas.openxmlformats.org/officeDocument/2006/relationships" xmlns:mc="http://schemas.openxmlformats.org/markup-compatibility/2006" xmlns:mv="urn:schemas-microsoft-com:mac:vml" xmlns:p="http://schemas.openxmlformats.org/presentationml/2006/main" mc:Ignorable="mv" mc:PreserveAttributes="mv:*">
+<p:sldMaster xmlns:a="http://schemas.openxmlformats.org/drawingml/2006/main" xmlns:r="http://schemas.openxmlformats.org/officeDocument/2006/relationships" xmlns:p="http://schemas.openxmlformats.org/presentationml/2006/main">
   <p:cSld>
     <p:bg>
       <p:bgRef idx="1001">
@@ -2665,7 +2665,7 @@
           <a:p>
             <a:fld id="{B1407716-76A5-4A4B-BEC0-21135680BD29}" type="datetimeFigureOut">
               <a:rPr lang="en-US" smtClean="0"/>
-              <a:t>4/5/17</a:t>
+              <a:t>06/04/2017</a:t>
             </a:fld>
             <a:endParaRPr lang="en-US"/>
           </a:p>
@@ -3019,7 +3019,7 @@
 </file>
 
 <file path=ppt/slides/slide1.xml><?xml version="1.0" encoding="utf-8"?>
-<p:sld xmlns:a="http://schemas.openxmlformats.org/drawingml/2006/main" xmlns:r="http://schemas.openxmlformats.org/officeDocument/2006/relationships" xmlns:mc="http://schemas.openxmlformats.org/markup-compatibility/2006" xmlns:mv="urn:schemas-microsoft-com:mac:vml" xmlns:p="http://schemas.openxmlformats.org/presentationml/2006/main" mc:Ignorable="mv" mc:PreserveAttributes="mv:*">
+<p:sld xmlns:a="http://schemas.openxmlformats.org/drawingml/2006/main" xmlns:r="http://schemas.openxmlformats.org/officeDocument/2006/relationships" xmlns:p="http://schemas.openxmlformats.org/presentationml/2006/main">
   <p:cSld>
     <p:spTree>
       <p:nvGrpSpPr>
@@ -3079,17 +3079,21 @@
           <a:p>
             <a:pPr algn="ctr"/>
             <a:r>
-              <a:rPr lang="en-US" sz="1600" dirty="0" smtClean="0">
+              <a:rPr lang="en-US" sz="1200" dirty="0" smtClean="0">
                 <a:solidFill>
                   <a:schemeClr val="tx1"/>
                 </a:solidFill>
+                <a:latin typeface="Verdana"/>
+                <a:cs typeface="Verdana"/>
               </a:rPr>
               <a:t>A</a:t>
             </a:r>
-            <a:endParaRPr lang="en-US" sz="1600" dirty="0">
+            <a:endParaRPr lang="en-US" sz="1200" dirty="0">
               <a:solidFill>
                 <a:schemeClr val="tx1"/>
               </a:solidFill>
+              <a:latin typeface="Verdana"/>
+              <a:cs typeface="Verdana"/>
             </a:endParaRPr>
           </a:p>
         </p:txBody>
@@ -3138,17 +3142,21 @@
           <a:p>
             <a:pPr algn="ctr"/>
             <a:r>
-              <a:rPr lang="en-US" sz="1600" dirty="0" smtClean="0">
+              <a:rPr lang="en-US" sz="1200" dirty="0" smtClean="0">
                 <a:solidFill>
                   <a:schemeClr val="tx1"/>
                 </a:solidFill>
+                <a:latin typeface="Verdana"/>
+                <a:cs typeface="Verdana"/>
               </a:rPr>
               <a:t>B+G</a:t>
             </a:r>
-            <a:endParaRPr lang="en-US" sz="1600" dirty="0">
+            <a:endParaRPr lang="en-US" sz="1200" dirty="0">
               <a:solidFill>
                 <a:schemeClr val="tx1"/>
               </a:solidFill>
+              <a:latin typeface="Verdana"/>
+              <a:cs typeface="Verdana"/>
             </a:endParaRPr>
           </a:p>
         </p:txBody>
@@ -3197,17 +3205,21 @@
           <a:p>
             <a:pPr algn="ctr"/>
             <a:r>
-              <a:rPr lang="en-US" sz="1600" dirty="0" smtClean="0">
+              <a:rPr lang="en-US" sz="1200" dirty="0" smtClean="0">
                 <a:solidFill>
                   <a:schemeClr val="tx1"/>
                 </a:solidFill>
+                <a:latin typeface="Verdana"/>
+                <a:cs typeface="Verdana"/>
               </a:rPr>
               <a:t>G+M</a:t>
             </a:r>
-            <a:endParaRPr lang="en-US" sz="1600" dirty="0">
+            <a:endParaRPr lang="en-US" sz="1200" dirty="0">
               <a:solidFill>
                 <a:schemeClr val="tx1"/>
               </a:solidFill>
+              <a:latin typeface="Verdana"/>
+              <a:cs typeface="Verdana"/>
             </a:endParaRPr>
           </a:p>
         </p:txBody>
@@ -3256,17 +3268,21 @@
           <a:p>
             <a:pPr algn="ctr"/>
             <a:r>
-              <a:rPr lang="en-US" sz="1600" dirty="0" smtClean="0">
+              <a:rPr lang="en-US" sz="1200" dirty="0" smtClean="0">
                 <a:solidFill>
                   <a:schemeClr val="tx1"/>
                 </a:solidFill>
+                <a:latin typeface="Verdana"/>
+                <a:cs typeface="Verdana"/>
               </a:rPr>
               <a:t>B</a:t>
             </a:r>
-            <a:endParaRPr lang="en-US" sz="1600" dirty="0">
+            <a:endParaRPr lang="en-US" sz="1200" dirty="0">
               <a:solidFill>
                 <a:schemeClr val="tx1"/>
               </a:solidFill>
+              <a:latin typeface="Verdana"/>
+              <a:cs typeface="Verdana"/>
             </a:endParaRPr>
           </a:p>
         </p:txBody>
@@ -3315,17 +3331,21 @@
           <a:p>
             <a:pPr algn="ctr"/>
             <a:r>
-              <a:rPr lang="en-US" sz="1600" dirty="0" smtClean="0">
+              <a:rPr lang="en-US" sz="1200" dirty="0" smtClean="0">
                 <a:solidFill>
                   <a:schemeClr val="tx1"/>
                 </a:solidFill>
+                <a:latin typeface="Verdana"/>
+                <a:cs typeface="Verdana"/>
               </a:rPr>
               <a:t>-</a:t>
             </a:r>
-            <a:endParaRPr lang="en-US" sz="1600" dirty="0">
+            <a:endParaRPr lang="en-US" sz="1200" dirty="0">
               <a:solidFill>
                 <a:schemeClr val="tx1"/>
               </a:solidFill>
+              <a:latin typeface="Verdana"/>
+              <a:cs typeface="Verdana"/>
             </a:endParaRPr>
           </a:p>
         </p:txBody>
@@ -3374,18 +3394,15 @@
           <a:p>
             <a:pPr algn="ctr"/>
             <a:r>
-              <a:rPr lang="en-US" sz="1600" dirty="0">
+              <a:rPr lang="en-US" sz="1200" dirty="0">
                 <a:solidFill>
                   <a:schemeClr val="tx1"/>
                 </a:solidFill>
+                <a:latin typeface="Verdana"/>
+                <a:cs typeface="Verdana"/>
               </a:rPr>
               <a:t>M</a:t>
             </a:r>
-            <a:endParaRPr lang="en-US" sz="1600" dirty="0">
-              <a:solidFill>
-                <a:schemeClr val="tx1"/>
-              </a:solidFill>
-            </a:endParaRPr>
           </a:p>
         </p:txBody>
       </p:sp>
@@ -3433,17 +3450,21 @@
           <a:p>
             <a:pPr algn="ctr"/>
             <a:r>
-              <a:rPr lang="en-US" sz="1600" dirty="0" smtClean="0">
+              <a:rPr lang="en-US" sz="1200" dirty="0" smtClean="0">
                 <a:solidFill>
                   <a:schemeClr val="tx1"/>
                 </a:solidFill>
+                <a:latin typeface="Verdana"/>
+                <a:cs typeface="Verdana"/>
               </a:rPr>
               <a:t>G</a:t>
             </a:r>
-            <a:endParaRPr lang="en-US" sz="1600" dirty="0">
+            <a:endParaRPr lang="en-US" sz="1200" dirty="0">
               <a:solidFill>
                 <a:schemeClr val="tx1"/>
               </a:solidFill>
+              <a:latin typeface="Verdana"/>
+              <a:cs typeface="Verdana"/>
             </a:endParaRPr>
           </a:p>
         </p:txBody>
@@ -3492,17 +3513,21 @@
           <a:p>
             <a:pPr algn="ctr"/>
             <a:r>
-              <a:rPr lang="en-US" sz="1600" dirty="0" smtClean="0">
+              <a:rPr lang="en-US" sz="1200" dirty="0" smtClean="0">
                 <a:solidFill>
                   <a:schemeClr val="tx1"/>
                 </a:solidFill>
+                <a:latin typeface="Verdana"/>
+                <a:cs typeface="Verdana"/>
               </a:rPr>
               <a:t>A+B</a:t>
             </a:r>
-            <a:endParaRPr lang="en-US" sz="1600" dirty="0">
+            <a:endParaRPr lang="en-US" sz="1200" dirty="0">
               <a:solidFill>
                 <a:schemeClr val="tx1"/>
               </a:solidFill>
+              <a:latin typeface="Verdana"/>
+              <a:cs typeface="Verdana"/>
             </a:endParaRPr>
           </a:p>
         </p:txBody>
@@ -3551,17 +3576,21 @@
           <a:p>
             <a:pPr algn="ctr"/>
             <a:r>
-              <a:rPr lang="en-US" sz="1600" dirty="0" smtClean="0">
+              <a:rPr lang="en-US" sz="1200" dirty="0" smtClean="0">
                 <a:solidFill>
                   <a:schemeClr val="tx1"/>
                 </a:solidFill>
+                <a:latin typeface="Verdana"/>
+                <a:cs typeface="Verdana"/>
               </a:rPr>
               <a:t>A+B+G</a:t>
             </a:r>
-            <a:endParaRPr lang="en-US" sz="1600" dirty="0">
+            <a:endParaRPr lang="en-US" sz="1200" dirty="0">
               <a:solidFill>
                 <a:schemeClr val="tx1"/>
               </a:solidFill>
+              <a:latin typeface="Verdana"/>
+              <a:cs typeface="Verdana"/>
             </a:endParaRPr>
           </a:p>
         </p:txBody>
@@ -3572,11 +3601,17 @@
           <p:cNvGraphicFramePr>
             <a:graphicFrameLocks noGrp="1"/>
           </p:cNvGraphicFramePr>
-          <p:nvPr/>
+          <p:nvPr>
+            <p:extLst>
+              <p:ext uri="{D42A27DB-BD31-4B8C-83A1-F6EECF244321}">
+                <p14:modId xmlns:p14="http://schemas.microsoft.com/office/powerpoint/2010/main" val="2779557137"/>
+              </p:ext>
+            </p:extLst>
+          </p:nvPr>
         </p:nvGraphicFramePr>
         <p:xfrm>
           <a:off x="1219200" y="2667000"/>
-          <a:ext cx="2438400" cy="2011680"/>
+          <a:ext cx="2438400" cy="1833882"/>
         </p:xfrm>
         <a:graphic>
           <a:graphicData uri="http://schemas.openxmlformats.org/drawingml/2006/table">
@@ -3595,10 +3630,16 @@
                     <a:lstStyle/>
                     <a:p>
                       <a:r>
-                        <a:rPr lang="en-US" sz="1600" dirty="0" smtClean="0"/>
+                        <a:rPr lang="en-US" sz="1200" dirty="0" smtClean="0">
+                          <a:latin typeface="Verdana"/>
+                          <a:cs typeface="Verdana"/>
+                        </a:rPr>
                         <a:t>Code</a:t>
                       </a:r>
-                      <a:endParaRPr lang="en-US" sz="1600" dirty="0"/>
+                      <a:endParaRPr lang="en-US" sz="1200" dirty="0">
+                        <a:latin typeface="Verdana"/>
+                        <a:cs typeface="Verdana"/>
+                      </a:endParaRPr>
                     </a:p>
                   </a:txBody>
                   <a:tcPr/>
@@ -3609,10 +3650,16 @@
                     <a:lstStyle/>
                     <a:p>
                       <a:r>
-                        <a:rPr lang="en-US" sz="1600" dirty="0" smtClean="0"/>
+                        <a:rPr lang="en-US" sz="1200" dirty="0" smtClean="0">
+                          <a:latin typeface="Verdana"/>
+                          <a:cs typeface="Verdana"/>
+                        </a:rPr>
                         <a:t>Phylum</a:t>
                       </a:r>
-                      <a:endParaRPr lang="en-US" sz="1600" dirty="0"/>
+                      <a:endParaRPr lang="en-US" sz="1200" dirty="0">
+                        <a:latin typeface="Verdana"/>
+                        <a:cs typeface="Verdana"/>
+                      </a:endParaRPr>
                     </a:p>
                   </a:txBody>
                   <a:tcPr/>
@@ -3625,10 +3672,16 @@
                     <a:lstStyle/>
                     <a:p>
                       <a:r>
-                        <a:rPr lang="en-US" sz="1600" dirty="0" smtClean="0"/>
+                        <a:rPr lang="en-US" sz="1200" dirty="0" smtClean="0">
+                          <a:latin typeface="Verdana"/>
+                          <a:cs typeface="Verdana"/>
+                        </a:rPr>
                         <a:t>A</a:t>
                       </a:r>
-                      <a:endParaRPr lang="en-US" sz="1600" dirty="0"/>
+                      <a:endParaRPr lang="en-US" sz="1200" dirty="0">
+                        <a:latin typeface="Verdana"/>
+                        <a:cs typeface="Verdana"/>
+                      </a:endParaRPr>
                     </a:p>
                   </a:txBody>
                   <a:tcPr/>
@@ -3639,10 +3692,16 @@
                     <a:lstStyle/>
                     <a:p>
                       <a:r>
-                        <a:rPr lang="en-US" sz="1600" dirty="0" err="1" smtClean="0"/>
+                        <a:rPr lang="en-US" sz="1200" dirty="0" err="1" smtClean="0">
+                          <a:latin typeface="Verdana"/>
+                          <a:cs typeface="Verdana"/>
+                        </a:rPr>
                         <a:t>Ascomycota</a:t>
                       </a:r>
-                      <a:endParaRPr lang="en-US" sz="1600" dirty="0"/>
+                      <a:endParaRPr lang="en-US" sz="1200" dirty="0">
+                        <a:latin typeface="Verdana"/>
+                        <a:cs typeface="Verdana"/>
+                      </a:endParaRPr>
                     </a:p>
                   </a:txBody>
                   <a:tcPr/>
@@ -3655,10 +3714,16 @@
                     <a:lstStyle/>
                     <a:p>
                       <a:r>
-                        <a:rPr lang="en-US" sz="1600" dirty="0" smtClean="0"/>
+                        <a:rPr lang="en-US" sz="1200" dirty="0" smtClean="0">
+                          <a:latin typeface="Verdana"/>
+                          <a:cs typeface="Verdana"/>
+                        </a:rPr>
                         <a:t>B</a:t>
                       </a:r>
-                      <a:endParaRPr lang="en-US" sz="1600" dirty="0"/>
+                      <a:endParaRPr lang="en-US" sz="1200" dirty="0">
+                        <a:latin typeface="Verdana"/>
+                        <a:cs typeface="Verdana"/>
+                      </a:endParaRPr>
                     </a:p>
                   </a:txBody>
                   <a:tcPr/>
@@ -3669,10 +3734,16 @@
                     <a:lstStyle/>
                     <a:p>
                       <a:r>
-                        <a:rPr lang="en-US" sz="1600" dirty="0" err="1" smtClean="0"/>
+                        <a:rPr lang="en-US" sz="1200" dirty="0" err="1" smtClean="0">
+                          <a:latin typeface="Verdana"/>
+                          <a:cs typeface="Verdana"/>
+                        </a:rPr>
                         <a:t>Basidiomycota</a:t>
                       </a:r>
-                      <a:endParaRPr lang="en-US" sz="1600" dirty="0"/>
+                      <a:endParaRPr lang="en-US" sz="1200" dirty="0">
+                        <a:latin typeface="Verdana"/>
+                        <a:cs typeface="Verdana"/>
+                      </a:endParaRPr>
                     </a:p>
                   </a:txBody>
                   <a:tcPr/>
@@ -3685,10 +3756,16 @@
                     <a:lstStyle/>
                     <a:p>
                       <a:r>
-                        <a:rPr lang="en-US" sz="1600" dirty="0" smtClean="0"/>
+                        <a:rPr lang="en-US" sz="1200" dirty="0" smtClean="0">
+                          <a:latin typeface="Verdana"/>
+                          <a:cs typeface="Verdana"/>
+                        </a:rPr>
                         <a:t>G</a:t>
                       </a:r>
-                      <a:endParaRPr lang="en-US" sz="1600" dirty="0"/>
+                      <a:endParaRPr lang="en-US" sz="1200" dirty="0">
+                        <a:latin typeface="Verdana"/>
+                        <a:cs typeface="Verdana"/>
+                      </a:endParaRPr>
                     </a:p>
                   </a:txBody>
                   <a:tcPr/>
@@ -3699,10 +3776,16 @@
                     <a:lstStyle/>
                     <a:p>
                       <a:r>
-                        <a:rPr lang="en-US" sz="1600" dirty="0" err="1" smtClean="0"/>
+                        <a:rPr lang="en-US" sz="1200" dirty="0" err="1" smtClean="0">
+                          <a:latin typeface="Verdana"/>
+                          <a:cs typeface="Verdana"/>
+                        </a:rPr>
                         <a:t>Glomeromycota</a:t>
                       </a:r>
-                      <a:endParaRPr lang="en-US" sz="1600" dirty="0"/>
+                      <a:endParaRPr lang="en-US" sz="1200" dirty="0">
+                        <a:latin typeface="Verdana"/>
+                        <a:cs typeface="Verdana"/>
+                      </a:endParaRPr>
                     </a:p>
                   </a:txBody>
                   <a:tcPr/>
@@ -3715,10 +3798,16 @@
                     <a:lstStyle/>
                     <a:p>
                       <a:r>
-                        <a:rPr lang="en-US" sz="1600" dirty="0" smtClean="0"/>
+                        <a:rPr lang="en-US" sz="1200" dirty="0" smtClean="0">
+                          <a:latin typeface="Verdana"/>
+                          <a:cs typeface="Verdana"/>
+                        </a:rPr>
                         <a:t>M</a:t>
                       </a:r>
-                      <a:endParaRPr lang="en-US" sz="1600" dirty="0"/>
+                      <a:endParaRPr lang="en-US" sz="1200" dirty="0">
+                        <a:latin typeface="Verdana"/>
+                        <a:cs typeface="Verdana"/>
+                      </a:endParaRPr>
                     </a:p>
                   </a:txBody>
                   <a:tcPr/>
@@ -3729,10 +3818,16 @@
                     <a:lstStyle/>
                     <a:p>
                       <a:r>
-                        <a:rPr lang="en-US" sz="1600" dirty="0" err="1" smtClean="0"/>
+                        <a:rPr lang="en-US" sz="1200" dirty="0" err="1" smtClean="0">
+                          <a:latin typeface="Verdana"/>
+                          <a:cs typeface="Verdana"/>
+                        </a:rPr>
                         <a:t>Mucoromycotina</a:t>
                       </a:r>
-                      <a:endParaRPr lang="en-US" sz="1600" dirty="0"/>
+                      <a:endParaRPr lang="en-US" sz="1200" dirty="0">
+                        <a:latin typeface="Verdana"/>
+                        <a:cs typeface="Verdana"/>
+                      </a:endParaRPr>
                     </a:p>
                   </a:txBody>
                   <a:tcPr/>
@@ -3745,10 +3840,16 @@
                     <a:lstStyle/>
                     <a:p>
                       <a:r>
-                        <a:rPr lang="en-US" sz="1600" dirty="0" smtClean="0"/>
+                        <a:rPr lang="en-US" sz="1200" dirty="0" smtClean="0">
+                          <a:latin typeface="Verdana"/>
+                          <a:cs typeface="Verdana"/>
+                        </a:rPr>
                         <a:t>-</a:t>
                       </a:r>
-                      <a:endParaRPr lang="en-US" sz="1600" dirty="0"/>
+                      <a:endParaRPr lang="en-US" sz="1200" dirty="0">
+                        <a:latin typeface="Verdana"/>
+                        <a:cs typeface="Verdana"/>
+                      </a:endParaRPr>
                     </a:p>
                   </a:txBody>
                   <a:tcPr/>
@@ -3759,10 +3860,16 @@
                     <a:lstStyle/>
                     <a:p>
                       <a:r>
-                        <a:rPr lang="en-US" sz="1600" dirty="0" smtClean="0"/>
+                        <a:rPr lang="en-US" sz="1200" dirty="0" smtClean="0">
+                          <a:latin typeface="Verdana"/>
+                          <a:cs typeface="Verdana"/>
+                        </a:rPr>
                         <a:t>no association</a:t>
                       </a:r>
-                      <a:endParaRPr lang="en-US" sz="1600" dirty="0"/>
+                      <a:endParaRPr lang="en-US" sz="1200" dirty="0">
+                        <a:latin typeface="Verdana"/>
+                        <a:cs typeface="Verdana"/>
+                      </a:endParaRPr>
                     </a:p>
                   </a:txBody>
                   <a:tcPr/>

</xml_diff>